<commit_message>
Improve software architecture description
</commit_message>
<xml_diff>
--- a/API/description/images/software-architecture.pptx
+++ b/API/description/images/software-architecture.pptx
@@ -289,7 +289,7 @@
             <a:fld id="{ECDCCF29-6264-45DF-9506-E514A2F38905}" type="datetimeFigureOut">
               <a:rPr lang="en-US" smtClean="0"/>
               <a:pPr/>
-              <a:t>6/19/2014</a:t>
+              <a:t>6/20/2014</a:t>
             </a:fld>
             <a:endParaRPr lang="en-US"/>
           </a:p>
@@ -456,7 +456,7 @@
             <a:fld id="{ECDCCF29-6264-45DF-9506-E514A2F38905}" type="datetimeFigureOut">
               <a:rPr lang="en-US" smtClean="0"/>
               <a:pPr/>
-              <a:t>6/19/2014</a:t>
+              <a:t>6/20/2014</a:t>
             </a:fld>
             <a:endParaRPr lang="en-US"/>
           </a:p>
@@ -633,7 +633,7 @@
             <a:fld id="{ECDCCF29-6264-45DF-9506-E514A2F38905}" type="datetimeFigureOut">
               <a:rPr lang="en-US" smtClean="0"/>
               <a:pPr/>
-              <a:t>6/19/2014</a:t>
+              <a:t>6/20/2014</a:t>
             </a:fld>
             <a:endParaRPr lang="en-US"/>
           </a:p>
@@ -800,7 +800,7 @@
             <a:fld id="{ECDCCF29-6264-45DF-9506-E514A2F38905}" type="datetimeFigureOut">
               <a:rPr lang="en-US" smtClean="0"/>
               <a:pPr/>
-              <a:t>6/19/2014</a:t>
+              <a:t>6/20/2014</a:t>
             </a:fld>
             <a:endParaRPr lang="en-US"/>
           </a:p>
@@ -1043,7 +1043,7 @@
             <a:fld id="{ECDCCF29-6264-45DF-9506-E514A2F38905}" type="datetimeFigureOut">
               <a:rPr lang="en-US" smtClean="0"/>
               <a:pPr/>
-              <a:t>6/19/2014</a:t>
+              <a:t>6/20/2014</a:t>
             </a:fld>
             <a:endParaRPr lang="en-US"/>
           </a:p>
@@ -1328,7 +1328,7 @@
             <a:fld id="{ECDCCF29-6264-45DF-9506-E514A2F38905}" type="datetimeFigureOut">
               <a:rPr lang="en-US" smtClean="0"/>
               <a:pPr/>
-              <a:t>6/19/2014</a:t>
+              <a:t>6/20/2014</a:t>
             </a:fld>
             <a:endParaRPr lang="en-US"/>
           </a:p>
@@ -1747,7 +1747,7 @@
             <a:fld id="{ECDCCF29-6264-45DF-9506-E514A2F38905}" type="datetimeFigureOut">
               <a:rPr lang="en-US" smtClean="0"/>
               <a:pPr/>
-              <a:t>6/19/2014</a:t>
+              <a:t>6/20/2014</a:t>
             </a:fld>
             <a:endParaRPr lang="en-US"/>
           </a:p>
@@ -1862,7 +1862,7 @@
             <a:fld id="{ECDCCF29-6264-45DF-9506-E514A2F38905}" type="datetimeFigureOut">
               <a:rPr lang="en-US" smtClean="0"/>
               <a:pPr/>
-              <a:t>6/19/2014</a:t>
+              <a:t>6/20/2014</a:t>
             </a:fld>
             <a:endParaRPr lang="en-US"/>
           </a:p>
@@ -1954,7 +1954,7 @@
             <a:fld id="{ECDCCF29-6264-45DF-9506-E514A2F38905}" type="datetimeFigureOut">
               <a:rPr lang="en-US" smtClean="0"/>
               <a:pPr/>
-              <a:t>6/19/2014</a:t>
+              <a:t>6/20/2014</a:t>
             </a:fld>
             <a:endParaRPr lang="en-US"/>
           </a:p>
@@ -2228,7 +2228,7 @@
             <a:fld id="{ECDCCF29-6264-45DF-9506-E514A2F38905}" type="datetimeFigureOut">
               <a:rPr lang="en-US" smtClean="0"/>
               <a:pPr/>
-              <a:t>6/19/2014</a:t>
+              <a:t>6/20/2014</a:t>
             </a:fld>
             <a:endParaRPr lang="en-US"/>
           </a:p>
@@ -2478,7 +2478,7 @@
             <a:fld id="{ECDCCF29-6264-45DF-9506-E514A2F38905}" type="datetimeFigureOut">
               <a:rPr lang="en-US" smtClean="0"/>
               <a:pPr/>
-              <a:t>6/19/2014</a:t>
+              <a:t>6/20/2014</a:t>
             </a:fld>
             <a:endParaRPr lang="en-US"/>
           </a:p>
@@ -2688,7 +2688,7 @@
             <a:fld id="{ECDCCF29-6264-45DF-9506-E514A2F38905}" type="datetimeFigureOut">
               <a:rPr lang="en-US" smtClean="0"/>
               <a:pPr/>
-              <a:t>6/19/2014</a:t>
+              <a:t>6/20/2014</a:t>
             </a:fld>
             <a:endParaRPr lang="en-US"/>
           </a:p>
@@ -3100,8 +3100,8 @@
         </p:nvSpPr>
         <p:spPr>
           <a:xfrm>
-            <a:off x="2123728" y="908720"/>
-            <a:ext cx="6552728" cy="4248472"/>
+            <a:off x="1043608" y="908720"/>
+            <a:ext cx="7632848" cy="4248472"/>
           </a:xfrm>
           <a:prstGeom prst="rect">
             <a:avLst/>
@@ -3204,7 +3204,7 @@
         </p:nvSpPr>
         <p:spPr>
           <a:xfrm>
-            <a:off x="2123728" y="908720"/>
+            <a:off x="1043608" y="908720"/>
             <a:ext cx="670889" cy="461665"/>
           </a:xfrm>
           <a:prstGeom prst="rect">
@@ -4025,7 +4025,7 @@
         </p:nvSpPr>
         <p:spPr>
           <a:xfrm>
-            <a:off x="7020272" y="3501008"/>
+            <a:off x="6948264" y="3491716"/>
             <a:ext cx="1656184" cy="369332"/>
           </a:xfrm>
           <a:prstGeom prst="rect">
@@ -4092,7 +4092,7 @@
         </p:nvSpPr>
         <p:spPr>
           <a:xfrm>
-            <a:off x="7452320" y="4077072"/>
+            <a:off x="7452320" y="2780928"/>
             <a:ext cx="1152128" cy="504056"/>
           </a:xfrm>
           <a:prstGeom prst="rect">
@@ -4133,18 +4133,19 @@
         <p:nvCxnSpPr>
           <p:cNvPr id="33" name="Connecteur droit avec flèche 32"/>
           <p:cNvCxnSpPr>
-            <a:stCxn id="32" idx="1"/>
             <a:endCxn id="10" idx="3"/>
           </p:cNvCxnSpPr>
           <p:nvPr/>
         </p:nvCxnSpPr>
         <p:spPr>
-          <a:xfrm flipH="1">
-            <a:off x="7164288" y="4329100"/>
-            <a:ext cx="288032" cy="0"/>
-          </a:xfrm>
-          <a:prstGeom prst="straightConnector1">
-            <a:avLst/>
+          <a:xfrm rot="10800000" flipV="1">
+            <a:off x="7164288" y="3284984"/>
+            <a:ext cx="1224136" cy="1044116"/>
+          </a:xfrm>
+          <a:prstGeom prst="bentConnector3">
+            <a:avLst>
+              <a:gd name="adj1" fmla="val -4"/>
+            </a:avLst>
           </a:prstGeom>
           <a:ln>
             <a:solidFill>
@@ -4170,6 +4171,144 @@
           </a:fontRef>
         </p:style>
       </p:cxnSp>
+      <p:sp>
+        <p:nvSpPr>
+          <p:cNvPr id="50" name="Accolade ouvrante 49"/>
+          <p:cNvSpPr/>
+          <p:nvPr/>
+        </p:nvSpPr>
+        <p:spPr>
+          <a:xfrm>
+            <a:off x="2195736" y="1268760"/>
+            <a:ext cx="189735" cy="2448272"/>
+          </a:xfrm>
+          <a:prstGeom prst="leftBrace">
+            <a:avLst/>
+          </a:prstGeom>
+        </p:spPr>
+        <p:style>
+          <a:lnRef idx="2">
+            <a:schemeClr val="accent1"/>
+          </a:lnRef>
+          <a:fillRef idx="0">
+            <a:schemeClr val="accent1"/>
+          </a:fillRef>
+          <a:effectRef idx="1">
+            <a:schemeClr val="accent1"/>
+          </a:effectRef>
+          <a:fontRef idx="minor">
+            <a:schemeClr val="tx1"/>
+          </a:fontRef>
+        </p:style>
+        <p:txBody>
+          <a:bodyPr rtlCol="0" anchor="ctr"/>
+          <a:lstStyle/>
+          <a:p>
+            <a:pPr algn="ctr"/>
+            <a:endParaRPr lang="en-US"/>
+          </a:p>
+        </p:txBody>
+      </p:sp>
+      <p:sp>
+        <p:nvSpPr>
+          <p:cNvPr id="51" name="ZoneTexte 50"/>
+          <p:cNvSpPr txBox="1"/>
+          <p:nvPr/>
+        </p:nvSpPr>
+        <p:spPr>
+          <a:xfrm>
+            <a:off x="971600" y="2132856"/>
+            <a:ext cx="1296144" cy="646331"/>
+          </a:xfrm>
+          <a:prstGeom prst="rect">
+            <a:avLst/>
+          </a:prstGeom>
+          <a:noFill/>
+        </p:spPr>
+        <p:txBody>
+          <a:bodyPr wrap="square" rtlCol="0">
+            <a:spAutoFit/>
+          </a:bodyPr>
+          <a:lstStyle/>
+          <a:p>
+            <a:pPr algn="r"/>
+            <a:r>
+              <a:rPr lang="en-US" dirty="0" smtClean="0"/>
+              <a:t>Application software</a:t>
+            </a:r>
+            <a:endParaRPr lang="en-US" dirty="0"/>
+          </a:p>
+        </p:txBody>
+      </p:sp>
+      <p:sp>
+        <p:nvSpPr>
+          <p:cNvPr id="52" name="Accolade ouvrante 51"/>
+          <p:cNvSpPr/>
+          <p:nvPr/>
+        </p:nvSpPr>
+        <p:spPr>
+          <a:xfrm>
+            <a:off x="2195736" y="3789040"/>
+            <a:ext cx="189735" cy="1296144"/>
+          </a:xfrm>
+          <a:prstGeom prst="leftBrace">
+            <a:avLst/>
+          </a:prstGeom>
+        </p:spPr>
+        <p:style>
+          <a:lnRef idx="2">
+            <a:schemeClr val="accent1"/>
+          </a:lnRef>
+          <a:fillRef idx="0">
+            <a:schemeClr val="accent1"/>
+          </a:fillRef>
+          <a:effectRef idx="1">
+            <a:schemeClr val="accent1"/>
+          </a:effectRef>
+          <a:fontRef idx="minor">
+            <a:schemeClr val="tx1"/>
+          </a:fontRef>
+        </p:style>
+        <p:txBody>
+          <a:bodyPr rtlCol="0" anchor="ctr"/>
+          <a:lstStyle/>
+          <a:p>
+            <a:pPr algn="ctr"/>
+            <a:endParaRPr lang="en-US"/>
+          </a:p>
+        </p:txBody>
+      </p:sp>
+      <p:sp>
+        <p:nvSpPr>
+          <p:cNvPr id="53" name="ZoneTexte 52"/>
+          <p:cNvSpPr txBox="1"/>
+          <p:nvPr/>
+        </p:nvSpPr>
+        <p:spPr>
+          <a:xfrm>
+            <a:off x="899592" y="4077072"/>
+            <a:ext cx="1296144" cy="646331"/>
+          </a:xfrm>
+          <a:prstGeom prst="rect">
+            <a:avLst/>
+          </a:prstGeom>
+          <a:noFill/>
+        </p:spPr>
+        <p:txBody>
+          <a:bodyPr wrap="square" rtlCol="0">
+            <a:spAutoFit/>
+          </a:bodyPr>
+          <a:lstStyle/>
+          <a:p>
+            <a:pPr algn="r"/>
+            <a:r>
+              <a:rPr lang="en-US" dirty="0" smtClean="0"/>
+              <a:t>Basic software</a:t>
+            </a:r>
+            <a:endParaRPr lang="en-US" dirty="0"/>
+          </a:p>
+        </p:txBody>
+      </p:sp>
     </p:spTree>
   </p:cSld>
   <p:clrMapOvr>

</xml_diff>

<commit_message>
Integrate remarks from Nicolas Boverie
</commit_message>
<xml_diff>
--- a/API/description/images/software-architecture.pptx
+++ b/API/description/images/software-architecture.pptx
@@ -289,7 +289,7 @@
             <a:fld id="{ECDCCF29-6264-45DF-9506-E514A2F38905}" type="datetimeFigureOut">
               <a:rPr lang="en-US" smtClean="0"/>
               <a:pPr/>
-              <a:t>6/20/2014</a:t>
+              <a:t>7/7/2014</a:t>
             </a:fld>
             <a:endParaRPr lang="en-US"/>
           </a:p>
@@ -456,7 +456,7 @@
             <a:fld id="{ECDCCF29-6264-45DF-9506-E514A2F38905}" type="datetimeFigureOut">
               <a:rPr lang="en-US" smtClean="0"/>
               <a:pPr/>
-              <a:t>6/20/2014</a:t>
+              <a:t>7/7/2014</a:t>
             </a:fld>
             <a:endParaRPr lang="en-US"/>
           </a:p>
@@ -633,7 +633,7 @@
             <a:fld id="{ECDCCF29-6264-45DF-9506-E514A2F38905}" type="datetimeFigureOut">
               <a:rPr lang="en-US" smtClean="0"/>
               <a:pPr/>
-              <a:t>6/20/2014</a:t>
+              <a:t>7/7/2014</a:t>
             </a:fld>
             <a:endParaRPr lang="en-US"/>
           </a:p>
@@ -800,7 +800,7 @@
             <a:fld id="{ECDCCF29-6264-45DF-9506-E514A2F38905}" type="datetimeFigureOut">
               <a:rPr lang="en-US" smtClean="0"/>
               <a:pPr/>
-              <a:t>6/20/2014</a:t>
+              <a:t>7/7/2014</a:t>
             </a:fld>
             <a:endParaRPr lang="en-US"/>
           </a:p>
@@ -1043,7 +1043,7 @@
             <a:fld id="{ECDCCF29-6264-45DF-9506-E514A2F38905}" type="datetimeFigureOut">
               <a:rPr lang="en-US" smtClean="0"/>
               <a:pPr/>
-              <a:t>6/20/2014</a:t>
+              <a:t>7/7/2014</a:t>
             </a:fld>
             <a:endParaRPr lang="en-US"/>
           </a:p>
@@ -1328,7 +1328,7 @@
             <a:fld id="{ECDCCF29-6264-45DF-9506-E514A2F38905}" type="datetimeFigureOut">
               <a:rPr lang="en-US" smtClean="0"/>
               <a:pPr/>
-              <a:t>6/20/2014</a:t>
+              <a:t>7/7/2014</a:t>
             </a:fld>
             <a:endParaRPr lang="en-US"/>
           </a:p>
@@ -1747,7 +1747,7 @@
             <a:fld id="{ECDCCF29-6264-45DF-9506-E514A2F38905}" type="datetimeFigureOut">
               <a:rPr lang="en-US" smtClean="0"/>
               <a:pPr/>
-              <a:t>6/20/2014</a:t>
+              <a:t>7/7/2014</a:t>
             </a:fld>
             <a:endParaRPr lang="en-US"/>
           </a:p>
@@ -1862,7 +1862,7 @@
             <a:fld id="{ECDCCF29-6264-45DF-9506-E514A2F38905}" type="datetimeFigureOut">
               <a:rPr lang="en-US" smtClean="0"/>
               <a:pPr/>
-              <a:t>6/20/2014</a:t>
+              <a:t>7/7/2014</a:t>
             </a:fld>
             <a:endParaRPr lang="en-US"/>
           </a:p>
@@ -1954,7 +1954,7 @@
             <a:fld id="{ECDCCF29-6264-45DF-9506-E514A2F38905}" type="datetimeFigureOut">
               <a:rPr lang="en-US" smtClean="0"/>
               <a:pPr/>
-              <a:t>6/20/2014</a:t>
+              <a:t>7/7/2014</a:t>
             </a:fld>
             <a:endParaRPr lang="en-US"/>
           </a:p>
@@ -2228,7 +2228,7 @@
             <a:fld id="{ECDCCF29-6264-45DF-9506-E514A2F38905}" type="datetimeFigureOut">
               <a:rPr lang="en-US" smtClean="0"/>
               <a:pPr/>
-              <a:t>6/20/2014</a:t>
+              <a:t>7/7/2014</a:t>
             </a:fld>
             <a:endParaRPr lang="en-US"/>
           </a:p>
@@ -2478,7 +2478,7 @@
             <a:fld id="{ECDCCF29-6264-45DF-9506-E514A2F38905}" type="datetimeFigureOut">
               <a:rPr lang="en-US" smtClean="0"/>
               <a:pPr/>
-              <a:t>6/20/2014</a:t>
+              <a:t>7/7/2014</a:t>
             </a:fld>
             <a:endParaRPr lang="en-US"/>
           </a:p>
@@ -2688,7 +2688,7 @@
             <a:fld id="{ECDCCF29-6264-45DF-9506-E514A2F38905}" type="datetimeFigureOut">
               <a:rPr lang="en-US" smtClean="0"/>
               <a:pPr/>
-              <a:t>6/20/2014</a:t>
+              <a:t>7/7/2014</a:t>
             </a:fld>
             <a:endParaRPr lang="en-US"/>
           </a:p>
@@ -3059,6 +3059,44 @@
           <a:chExt cx="0" cy="0"/>
         </a:xfrm>
       </p:grpSpPr>
+      <p:sp>
+        <p:nvSpPr>
+          <p:cNvPr id="2" name="Rectangle 1"/>
+          <p:cNvSpPr/>
+          <p:nvPr/>
+        </p:nvSpPr>
+        <p:spPr>
+          <a:xfrm>
+            <a:off x="1043608" y="908720"/>
+            <a:ext cx="7704856" cy="5040560"/>
+          </a:xfrm>
+          <a:prstGeom prst="rect">
+            <a:avLst/>
+          </a:prstGeom>
+        </p:spPr>
+        <p:style>
+          <a:lnRef idx="2">
+            <a:schemeClr val="accent1"/>
+          </a:lnRef>
+          <a:fillRef idx="1">
+            <a:schemeClr val="lt1"/>
+          </a:fillRef>
+          <a:effectRef idx="0">
+            <a:schemeClr val="accent1"/>
+          </a:effectRef>
+          <a:fontRef idx="minor">
+            <a:schemeClr val="dk1"/>
+          </a:fontRef>
+        </p:style>
+        <p:txBody>
+          <a:bodyPr rtlCol="0" anchor="ctr"/>
+          <a:lstStyle/>
+          <a:p>
+            <a:pPr algn="ctr"/>
+            <a:endParaRPr lang="en-US" dirty="0"/>
+          </a:p>
+        </p:txBody>
+      </p:sp>
       <p:cxnSp>
         <p:nvCxnSpPr>
           <p:cNvPr id="42" name="Connecteur droit 41"/>
@@ -3092,44 +3130,6 @@
           </a:fontRef>
         </p:style>
       </p:cxnSp>
-      <p:sp>
-        <p:nvSpPr>
-          <p:cNvPr id="2" name="Rectangle 1"/>
-          <p:cNvSpPr/>
-          <p:nvPr/>
-        </p:nvSpPr>
-        <p:spPr>
-          <a:xfrm>
-            <a:off x="1043608" y="908720"/>
-            <a:ext cx="7632848" cy="4248472"/>
-          </a:xfrm>
-          <a:prstGeom prst="rect">
-            <a:avLst/>
-          </a:prstGeom>
-        </p:spPr>
-        <p:style>
-          <a:lnRef idx="2">
-            <a:schemeClr val="accent1"/>
-          </a:lnRef>
-          <a:fillRef idx="1">
-            <a:schemeClr val="lt1"/>
-          </a:fillRef>
-          <a:effectRef idx="0">
-            <a:schemeClr val="accent1"/>
-          </a:effectRef>
-          <a:fontRef idx="minor">
-            <a:schemeClr val="dk1"/>
-          </a:fontRef>
-        </p:style>
-        <p:txBody>
-          <a:bodyPr rtlCol="0" anchor="ctr"/>
-          <a:lstStyle/>
-          <a:p>
-            <a:pPr algn="ctr"/>
-            <a:endParaRPr lang="en-US" dirty="0"/>
-          </a:p>
-        </p:txBody>
-      </p:sp>
       <p:cxnSp>
         <p:nvCxnSpPr>
           <p:cNvPr id="38" name="Connecteur droit 37"/>
@@ -4249,7 +4249,7 @@
         <p:spPr>
           <a:xfrm>
             <a:off x="2195736" y="3789040"/>
-            <a:ext cx="189735" cy="1296144"/>
+            <a:ext cx="189735" cy="1440160"/>
           </a:xfrm>
           <a:prstGeom prst="leftBrace">
             <a:avLst/>

</xml_diff>

<commit_message>
Integrate Pierre-Yves Le Morvan comments in document
</commit_message>
<xml_diff>
--- a/API/description/images/software-architecture.pptx
+++ b/API/description/images/software-architecture.pptx
@@ -3067,8 +3067,8 @@
         </p:nvSpPr>
         <p:spPr>
           <a:xfrm>
-            <a:off x="1043608" y="908720"/>
-            <a:ext cx="7704856" cy="5040560"/>
+            <a:off x="395536" y="908720"/>
+            <a:ext cx="8496944" cy="5040560"/>
           </a:xfrm>
           <a:prstGeom prst="rect">
             <a:avLst/>
@@ -3105,7 +3105,7 @@
         </p:nvCxnSpPr>
         <p:spPr>
           <a:xfrm>
-            <a:off x="2411760" y="5301208"/>
+            <a:off x="1763688" y="5301208"/>
             <a:ext cx="4896544" cy="0"/>
           </a:xfrm>
           <a:prstGeom prst="line">
@@ -3138,7 +3138,7 @@
         </p:nvCxnSpPr>
         <p:spPr>
           <a:xfrm>
-            <a:off x="2411760" y="2420888"/>
+            <a:off x="1763688" y="2420888"/>
             <a:ext cx="4680520" cy="0"/>
           </a:xfrm>
           <a:prstGeom prst="line">
@@ -3171,7 +3171,7 @@
         </p:nvCxnSpPr>
         <p:spPr>
           <a:xfrm>
-            <a:off x="2411760" y="3717032"/>
+            <a:off x="1763688" y="3717032"/>
             <a:ext cx="4680520" cy="0"/>
           </a:xfrm>
           <a:prstGeom prst="line">
@@ -3204,7 +3204,7 @@
         </p:nvSpPr>
         <p:spPr>
           <a:xfrm>
-            <a:off x="1043608" y="908720"/>
+            <a:off x="395536" y="908720"/>
             <a:ext cx="670889" cy="461665"/>
           </a:xfrm>
           <a:prstGeom prst="rect">
@@ -3234,7 +3234,7 @@
         </p:nvSpPr>
         <p:spPr>
           <a:xfrm>
-            <a:off x="2627784" y="1340768"/>
+            <a:off x="1979712" y="1340768"/>
             <a:ext cx="4464496" cy="864096"/>
           </a:xfrm>
           <a:prstGeom prst="rect">
@@ -3276,7 +3276,7 @@
         </p:nvSpPr>
         <p:spPr>
           <a:xfrm>
-            <a:off x="2627784" y="2708920"/>
+            <a:off x="1979712" y="2708920"/>
             <a:ext cx="4464496" cy="792088"/>
           </a:xfrm>
           <a:prstGeom prst="rect">
@@ -3320,13 +3320,13 @@
       </p:sp>
       <p:sp>
         <p:nvSpPr>
-          <p:cNvPr id="6" name="Rectangle 5"/>
+          <p:cNvPr id="10" name="Rectangle 9"/>
           <p:cNvSpPr/>
           <p:nvPr/>
         </p:nvSpPr>
         <p:spPr>
           <a:xfrm>
-            <a:off x="2627784" y="3933056"/>
+            <a:off x="4932040" y="4293096"/>
             <a:ext cx="1080120" cy="792088"/>
           </a:xfrm>
           <a:prstGeom prst="rect">
@@ -3354,7 +3354,14 @@
             <a:pPr algn="ctr"/>
             <a:r>
               <a:rPr lang="en-US" dirty="0" smtClean="0"/>
-              <a:t>Alstom API adapter</a:t>
+              <a:t>ERSA</a:t>
+            </a:r>
+          </a:p>
+          <a:p>
+            <a:pPr algn="ctr"/>
+            <a:r>
+              <a:rPr lang="en-US" dirty="0" smtClean="0"/>
+              <a:t>API adapter</a:t>
             </a:r>
             <a:endParaRPr lang="en-US" dirty="0"/>
           </a:p>
@@ -3362,13 +3369,13 @@
       </p:sp>
       <p:sp>
         <p:nvSpPr>
-          <p:cNvPr id="7" name="Rectangle 6"/>
+          <p:cNvPr id="8" name="Rectangle 7"/>
           <p:cNvSpPr/>
           <p:nvPr/>
         </p:nvSpPr>
         <p:spPr>
           <a:xfrm>
-            <a:off x="3779912" y="3933056"/>
+            <a:off x="3923928" y="4221088"/>
             <a:ext cx="1080120" cy="792088"/>
           </a:xfrm>
           <a:prstGeom prst="rect">
@@ -3396,7 +3403,7 @@
             <a:pPr algn="ctr"/>
             <a:r>
               <a:rPr lang="en-US" dirty="0" smtClean="0"/>
-              <a:t>GE </a:t>
+              <a:t>Siemens</a:t>
             </a:r>
           </a:p>
           <a:p>
@@ -3411,13 +3418,13 @@
       </p:sp>
       <p:sp>
         <p:nvSpPr>
-          <p:cNvPr id="8" name="Rectangle 7"/>
+          <p:cNvPr id="7" name="Rectangle 6"/>
           <p:cNvSpPr/>
           <p:nvPr/>
         </p:nvSpPr>
         <p:spPr>
           <a:xfrm>
-            <a:off x="4932040" y="3933056"/>
+            <a:off x="2915816" y="4149080"/>
             <a:ext cx="1080120" cy="792088"/>
           </a:xfrm>
           <a:prstGeom prst="rect">
@@ -3445,7 +3452,7 @@
             <a:pPr algn="ctr"/>
             <a:r>
               <a:rPr lang="en-US" dirty="0" smtClean="0"/>
-              <a:t>Siemens</a:t>
+              <a:t>GE </a:t>
             </a:r>
           </a:p>
           <a:p>
@@ -3458,15 +3465,52 @@
           </a:p>
         </p:txBody>
       </p:sp>
-      <p:sp>
-        <p:nvSpPr>
-          <p:cNvPr id="10" name="Rectangle 9"/>
+      <p:cxnSp>
+        <p:nvCxnSpPr>
+          <p:cNvPr id="12" name="Connecteur droit avec flèche 11"/>
+          <p:cNvCxnSpPr>
+            <a:stCxn id="4" idx="2"/>
+            <a:endCxn id="5" idx="0"/>
+          </p:cNvCxnSpPr>
+          <p:nvPr/>
+        </p:nvCxnSpPr>
+        <p:spPr>
+          <a:xfrm>
+            <a:off x="4211960" y="2204864"/>
+            <a:ext cx="0" cy="504056"/>
+          </a:xfrm>
+          <a:prstGeom prst="straightConnector1">
+            <a:avLst/>
+          </a:prstGeom>
+          <a:ln>
+            <a:headEnd type="arrow" w="med" len="med"/>
+            <a:tailEnd type="arrow" w="med" len="med"/>
+          </a:ln>
+        </p:spPr>
+        <p:style>
+          <a:lnRef idx="2">
+            <a:schemeClr val="accent1"/>
+          </a:lnRef>
+          <a:fillRef idx="0">
+            <a:schemeClr val="accent1"/>
+          </a:fillRef>
+          <a:effectRef idx="1">
+            <a:schemeClr val="accent1"/>
+          </a:effectRef>
+          <a:fontRef idx="minor">
+            <a:schemeClr val="tx1"/>
+          </a:fontRef>
+        </p:style>
+      </p:cxnSp>
+      <p:sp>
+        <p:nvSpPr>
+          <p:cNvPr id="22" name="Rectangle 21"/>
           <p:cNvSpPr/>
           <p:nvPr/>
         </p:nvSpPr>
         <p:spPr>
           <a:xfrm>
-            <a:off x="6084168" y="3933056"/>
+            <a:off x="4932040" y="5733256"/>
             <a:ext cx="1080120" cy="792088"/>
           </a:xfrm>
           <a:prstGeom prst="rect">
@@ -3494,14 +3538,91 @@
             <a:pPr algn="ctr"/>
             <a:r>
               <a:rPr lang="en-US" dirty="0" smtClean="0"/>
-              <a:t>ERSA</a:t>
-            </a:r>
-          </a:p>
+              <a:t>ERSA simulator</a:t>
+            </a:r>
+            <a:endParaRPr lang="en-US" dirty="0"/>
+          </a:p>
+        </p:txBody>
+      </p:sp>
+      <p:sp>
+        <p:nvSpPr>
+          <p:cNvPr id="21" name="Rectangle 20"/>
+          <p:cNvSpPr/>
+          <p:nvPr/>
+        </p:nvSpPr>
+        <p:spPr>
+          <a:xfrm>
+            <a:off x="3923928" y="5661248"/>
+            <a:ext cx="1080120" cy="792088"/>
+          </a:xfrm>
+          <a:prstGeom prst="rect">
+            <a:avLst/>
+          </a:prstGeom>
+        </p:spPr>
+        <p:style>
+          <a:lnRef idx="1">
+            <a:schemeClr val="accent3"/>
+          </a:lnRef>
+          <a:fillRef idx="3">
+            <a:schemeClr val="accent3"/>
+          </a:fillRef>
+          <a:effectRef idx="2">
+            <a:schemeClr val="accent3"/>
+          </a:effectRef>
+          <a:fontRef idx="minor">
+            <a:schemeClr val="lt1"/>
+          </a:fontRef>
+        </p:style>
+        <p:txBody>
+          <a:bodyPr rtlCol="0" anchor="ctr"/>
+          <a:lstStyle/>
           <a:p>
             <a:pPr algn="ctr"/>
             <a:r>
               <a:rPr lang="en-US" dirty="0" smtClean="0"/>
-              <a:t>API adapter</a:t>
+              <a:t>Siemens specific platform</a:t>
+            </a:r>
+            <a:endParaRPr lang="en-US" dirty="0"/>
+          </a:p>
+        </p:txBody>
+      </p:sp>
+      <p:sp>
+        <p:nvSpPr>
+          <p:cNvPr id="20" name="Rectangle 19"/>
+          <p:cNvSpPr/>
+          <p:nvPr/>
+        </p:nvSpPr>
+        <p:spPr>
+          <a:xfrm>
+            <a:off x="2915816" y="5589240"/>
+            <a:ext cx="1080120" cy="792088"/>
+          </a:xfrm>
+          <a:prstGeom prst="rect">
+            <a:avLst/>
+          </a:prstGeom>
+        </p:spPr>
+        <p:style>
+          <a:lnRef idx="1">
+            <a:schemeClr val="accent3"/>
+          </a:lnRef>
+          <a:fillRef idx="3">
+            <a:schemeClr val="accent3"/>
+          </a:fillRef>
+          <a:effectRef idx="2">
+            <a:schemeClr val="accent3"/>
+          </a:effectRef>
+          <a:fontRef idx="minor">
+            <a:schemeClr val="lt1"/>
+          </a:fontRef>
+        </p:style>
+        <p:txBody>
+          <a:bodyPr rtlCol="0" anchor="ctr"/>
+          <a:lstStyle/>
+          <a:p>
+            <a:pPr algn="ctr"/>
+            <a:r>
+              <a:rPr lang="en-US" dirty="0" smtClean="0"/>
+              <a:t>GE specific platform</a:t>
             </a:r>
             <a:endParaRPr lang="en-US" dirty="0"/>
           </a:p>
@@ -3509,17 +3630,16 @@
       </p:sp>
       <p:cxnSp>
         <p:nvCxnSpPr>
-          <p:cNvPr id="12" name="Connecteur droit avec flèche 11"/>
+          <p:cNvPr id="30" name="Connecteur droit avec flèche 29"/>
           <p:cNvCxnSpPr>
-            <a:stCxn id="4" idx="2"/>
-            <a:endCxn id="5" idx="0"/>
+            <a:endCxn id="56" idx="1"/>
           </p:cNvCxnSpPr>
           <p:nvPr/>
         </p:nvCxnSpPr>
         <p:spPr>
           <a:xfrm>
-            <a:off x="4860032" y="2204864"/>
-            <a:ext cx="0" cy="504056"/>
+            <a:off x="3995936" y="3501008"/>
+            <a:ext cx="0" cy="360040"/>
           </a:xfrm>
           <a:prstGeom prst="straightConnector1">
             <a:avLst/>
@@ -3546,14 +3666,17 @@
       </p:cxnSp>
       <p:cxnSp>
         <p:nvCxnSpPr>
-          <p:cNvPr id="17" name="Connecteur droit avec flèche 16"/>
-          <p:cNvCxnSpPr/>
+          <p:cNvPr id="36" name="Connecteur droit avec flèche 35"/>
+          <p:cNvCxnSpPr>
+            <a:stCxn id="10" idx="2"/>
+            <a:endCxn id="22" idx="0"/>
+          </p:cNvCxnSpPr>
           <p:nvPr/>
         </p:nvCxnSpPr>
         <p:spPr>
           <a:xfrm>
-            <a:off x="5436096" y="3501008"/>
-            <a:ext cx="0" cy="432048"/>
+            <a:off x="5472100" y="5085184"/>
+            <a:ext cx="0" cy="648072"/>
           </a:xfrm>
           <a:prstGeom prst="straightConnector1">
             <a:avLst/>
@@ -3565,13 +3688,13 @@
         </p:spPr>
         <p:style>
           <a:lnRef idx="2">
-            <a:schemeClr val="accent1"/>
+            <a:schemeClr val="accent3"/>
           </a:lnRef>
           <a:fillRef idx="0">
-            <a:schemeClr val="accent1"/>
+            <a:schemeClr val="accent3"/>
           </a:fillRef>
           <a:effectRef idx="1">
-            <a:schemeClr val="accent1"/>
+            <a:schemeClr val="accent3"/>
           </a:effectRef>
           <a:fontRef idx="minor">
             <a:schemeClr val="tx1"/>
@@ -3580,287 +3703,17 @@
       </p:cxnSp>
       <p:cxnSp>
         <p:nvCxnSpPr>
-          <p:cNvPr id="18" name="Connecteur droit avec flèche 17"/>
-          <p:cNvCxnSpPr/>
-          <p:nvPr/>
-        </p:nvCxnSpPr>
-        <p:spPr>
-          <a:xfrm>
-            <a:off x="6588224" y="3501008"/>
-            <a:ext cx="0" cy="432048"/>
-          </a:xfrm>
-          <a:prstGeom prst="straightConnector1">
-            <a:avLst/>
-          </a:prstGeom>
-          <a:ln>
-            <a:headEnd type="arrow" w="med" len="med"/>
-            <a:tailEnd type="arrow" w="med" len="med"/>
-          </a:ln>
-        </p:spPr>
-        <p:style>
-          <a:lnRef idx="2">
-            <a:schemeClr val="accent1"/>
-          </a:lnRef>
-          <a:fillRef idx="0">
-            <a:schemeClr val="accent1"/>
-          </a:fillRef>
-          <a:effectRef idx="1">
-            <a:schemeClr val="accent1"/>
-          </a:effectRef>
-          <a:fontRef idx="minor">
-            <a:schemeClr val="tx1"/>
-          </a:fontRef>
-        </p:style>
-      </p:cxnSp>
-      <p:sp>
-        <p:nvSpPr>
-          <p:cNvPr id="19" name="Rectangle 18"/>
-          <p:cNvSpPr/>
-          <p:nvPr/>
-        </p:nvSpPr>
-        <p:spPr>
-          <a:xfrm>
-            <a:off x="2627784" y="5517232"/>
-            <a:ext cx="1080120" cy="792088"/>
-          </a:xfrm>
-          <a:prstGeom prst="rect">
-            <a:avLst/>
-          </a:prstGeom>
-        </p:spPr>
-        <p:style>
-          <a:lnRef idx="1">
-            <a:schemeClr val="accent3"/>
-          </a:lnRef>
-          <a:fillRef idx="3">
-            <a:schemeClr val="accent3"/>
-          </a:fillRef>
-          <a:effectRef idx="2">
-            <a:schemeClr val="accent3"/>
-          </a:effectRef>
-          <a:fontRef idx="minor">
-            <a:schemeClr val="lt1"/>
-          </a:fontRef>
-        </p:style>
-        <p:txBody>
-          <a:bodyPr rtlCol="0" anchor="ctr"/>
-          <a:lstStyle/>
-          <a:p>
-            <a:pPr algn="ctr"/>
-            <a:r>
-              <a:rPr lang="en-US" dirty="0" smtClean="0"/>
-              <a:t>Alstom specific platform</a:t>
-            </a:r>
-            <a:endParaRPr lang="en-US" dirty="0"/>
-          </a:p>
-        </p:txBody>
-      </p:sp>
-      <p:sp>
-        <p:nvSpPr>
-          <p:cNvPr id="20" name="Rectangle 19"/>
-          <p:cNvSpPr/>
-          <p:nvPr/>
-        </p:nvSpPr>
-        <p:spPr>
-          <a:xfrm>
-            <a:off x="3779912" y="5517232"/>
-            <a:ext cx="1080120" cy="792088"/>
-          </a:xfrm>
-          <a:prstGeom prst="rect">
-            <a:avLst/>
-          </a:prstGeom>
-        </p:spPr>
-        <p:style>
-          <a:lnRef idx="1">
-            <a:schemeClr val="accent3"/>
-          </a:lnRef>
-          <a:fillRef idx="3">
-            <a:schemeClr val="accent3"/>
-          </a:fillRef>
-          <a:effectRef idx="2">
-            <a:schemeClr val="accent3"/>
-          </a:effectRef>
-          <a:fontRef idx="minor">
-            <a:schemeClr val="lt1"/>
-          </a:fontRef>
-        </p:style>
-        <p:txBody>
-          <a:bodyPr rtlCol="0" anchor="ctr"/>
-          <a:lstStyle/>
-          <a:p>
-            <a:pPr algn="ctr"/>
-            <a:r>
-              <a:rPr lang="en-US" dirty="0" smtClean="0"/>
-              <a:t>GE specific platform</a:t>
-            </a:r>
-            <a:endParaRPr lang="en-US" dirty="0"/>
-          </a:p>
-        </p:txBody>
-      </p:sp>
-      <p:sp>
-        <p:nvSpPr>
-          <p:cNvPr id="21" name="Rectangle 20"/>
-          <p:cNvSpPr/>
-          <p:nvPr/>
-        </p:nvSpPr>
-        <p:spPr>
-          <a:xfrm>
-            <a:off x="4932040" y="5517232"/>
-            <a:ext cx="1080120" cy="792088"/>
-          </a:xfrm>
-          <a:prstGeom prst="rect">
-            <a:avLst/>
-          </a:prstGeom>
-        </p:spPr>
-        <p:style>
-          <a:lnRef idx="1">
-            <a:schemeClr val="accent3"/>
-          </a:lnRef>
-          <a:fillRef idx="3">
-            <a:schemeClr val="accent3"/>
-          </a:fillRef>
-          <a:effectRef idx="2">
-            <a:schemeClr val="accent3"/>
-          </a:effectRef>
-          <a:fontRef idx="minor">
-            <a:schemeClr val="lt1"/>
-          </a:fontRef>
-        </p:style>
-        <p:txBody>
-          <a:bodyPr rtlCol="0" anchor="ctr"/>
-          <a:lstStyle/>
-          <a:p>
-            <a:pPr algn="ctr"/>
-            <a:r>
-              <a:rPr lang="en-US" dirty="0" smtClean="0"/>
-              <a:t>Siemens specific platform</a:t>
-            </a:r>
-            <a:endParaRPr lang="en-US" dirty="0"/>
-          </a:p>
-        </p:txBody>
-      </p:sp>
-      <p:sp>
-        <p:nvSpPr>
-          <p:cNvPr id="22" name="Rectangle 21"/>
-          <p:cNvSpPr/>
-          <p:nvPr/>
-        </p:nvSpPr>
-        <p:spPr>
-          <a:xfrm>
-            <a:off x="6084168" y="5517232"/>
-            <a:ext cx="1080120" cy="792088"/>
-          </a:xfrm>
-          <a:prstGeom prst="rect">
-            <a:avLst/>
-          </a:prstGeom>
-        </p:spPr>
-        <p:style>
-          <a:lnRef idx="1">
-            <a:schemeClr val="accent3"/>
-          </a:lnRef>
-          <a:fillRef idx="3">
-            <a:schemeClr val="accent3"/>
-          </a:fillRef>
-          <a:effectRef idx="2">
-            <a:schemeClr val="accent3"/>
-          </a:effectRef>
-          <a:fontRef idx="minor">
-            <a:schemeClr val="lt1"/>
-          </a:fontRef>
-        </p:style>
-        <p:txBody>
-          <a:bodyPr rtlCol="0" anchor="ctr"/>
-          <a:lstStyle/>
-          <a:p>
-            <a:pPr algn="ctr"/>
-            <a:r>
-              <a:rPr lang="en-US" dirty="0" smtClean="0"/>
-              <a:t>ERSA simulator</a:t>
-            </a:r>
-            <a:endParaRPr lang="en-US" dirty="0"/>
-          </a:p>
-        </p:txBody>
-      </p:sp>
-      <p:cxnSp>
-        <p:nvCxnSpPr>
-          <p:cNvPr id="29" name="Connecteur droit avec flèche 28"/>
-          <p:cNvCxnSpPr/>
-          <p:nvPr/>
-        </p:nvCxnSpPr>
-        <p:spPr>
-          <a:xfrm>
-            <a:off x="4283968" y="3501008"/>
-            <a:ext cx="0" cy="432048"/>
-          </a:xfrm>
-          <a:prstGeom prst="straightConnector1">
-            <a:avLst/>
-          </a:prstGeom>
-          <a:ln>
-            <a:headEnd type="arrow" w="med" len="med"/>
-            <a:tailEnd type="arrow" w="med" len="med"/>
-          </a:ln>
-        </p:spPr>
-        <p:style>
-          <a:lnRef idx="2">
-            <a:schemeClr val="accent1"/>
-          </a:lnRef>
-          <a:fillRef idx="0">
-            <a:schemeClr val="accent1"/>
-          </a:fillRef>
-          <a:effectRef idx="1">
-            <a:schemeClr val="accent1"/>
-          </a:effectRef>
-          <a:fontRef idx="minor">
-            <a:schemeClr val="tx1"/>
-          </a:fontRef>
-        </p:style>
-      </p:cxnSp>
-      <p:cxnSp>
-        <p:nvCxnSpPr>
-          <p:cNvPr id="30" name="Connecteur droit avec flèche 29"/>
-          <p:cNvCxnSpPr/>
-          <p:nvPr/>
-        </p:nvCxnSpPr>
-        <p:spPr>
-          <a:xfrm>
-            <a:off x="3131840" y="3501008"/>
-            <a:ext cx="0" cy="432048"/>
-          </a:xfrm>
-          <a:prstGeom prst="straightConnector1">
-            <a:avLst/>
-          </a:prstGeom>
-          <a:ln>
-            <a:headEnd type="arrow" w="med" len="med"/>
-            <a:tailEnd type="arrow" w="med" len="med"/>
-          </a:ln>
-        </p:spPr>
-        <p:style>
-          <a:lnRef idx="2">
-            <a:schemeClr val="accent1"/>
-          </a:lnRef>
-          <a:fillRef idx="0">
-            <a:schemeClr val="accent1"/>
-          </a:fillRef>
-          <a:effectRef idx="1">
-            <a:schemeClr val="accent1"/>
-          </a:effectRef>
-          <a:fontRef idx="minor">
-            <a:schemeClr val="tx1"/>
-          </a:fontRef>
-        </p:style>
-      </p:cxnSp>
-      <p:cxnSp>
-        <p:nvCxnSpPr>
-          <p:cNvPr id="31" name="Connecteur droit avec flèche 30"/>
+          <p:cNvPr id="35" name="Connecteur droit avec flèche 34"/>
           <p:cNvCxnSpPr>
-            <a:stCxn id="6" idx="2"/>
-            <a:endCxn id="19" idx="0"/>
+            <a:stCxn id="8" idx="2"/>
+            <a:endCxn id="21" idx="0"/>
           </p:cNvCxnSpPr>
           <p:nvPr/>
         </p:nvCxnSpPr>
         <p:spPr>
           <a:xfrm>
-            <a:off x="3167844" y="4725144"/>
-            <a:ext cx="0" cy="792088"/>
+            <a:off x="4463988" y="5013176"/>
+            <a:ext cx="0" cy="648072"/>
           </a:xfrm>
           <a:prstGeom prst="straightConnector1">
             <a:avLst/>
@@ -3888,13 +3741,16 @@
       <p:cxnSp>
         <p:nvCxnSpPr>
           <p:cNvPr id="34" name="Connecteur droit avec flèche 33"/>
-          <p:cNvCxnSpPr/>
+          <p:cNvCxnSpPr>
+            <a:stCxn id="7" idx="2"/>
+            <a:endCxn id="20" idx="0"/>
+          </p:cNvCxnSpPr>
           <p:nvPr/>
         </p:nvCxnSpPr>
         <p:spPr>
           <a:xfrm>
-            <a:off x="4355976" y="4725144"/>
-            <a:ext cx="0" cy="792088"/>
+            <a:off x="3455876" y="4941168"/>
+            <a:ext cx="0" cy="648072"/>
           </a:xfrm>
           <a:prstGeom prst="straightConnector1">
             <a:avLst/>
@@ -3919,16 +3775,510 @@
           </a:fontRef>
         </p:style>
       </p:cxnSp>
+      <p:sp>
+        <p:nvSpPr>
+          <p:cNvPr id="39" name="ZoneTexte 38"/>
+          <p:cNvSpPr txBox="1"/>
+          <p:nvPr/>
+        </p:nvSpPr>
+        <p:spPr>
+          <a:xfrm>
+            <a:off x="6372200" y="2204864"/>
+            <a:ext cx="1656184" cy="369332"/>
+          </a:xfrm>
+          <a:prstGeom prst="rect">
+            <a:avLst/>
+          </a:prstGeom>
+          <a:noFill/>
+        </p:spPr>
+        <p:txBody>
+          <a:bodyPr wrap="square" rtlCol="0">
+            <a:spAutoFit/>
+          </a:bodyPr>
+          <a:lstStyle/>
+          <a:p>
+            <a:r>
+              <a:rPr lang="en-US" dirty="0" smtClean="0"/>
+              <a:t>model interface</a:t>
+            </a:r>
+            <a:endParaRPr lang="en-US" dirty="0"/>
+          </a:p>
+        </p:txBody>
+      </p:sp>
+      <p:sp>
+        <p:nvSpPr>
+          <p:cNvPr id="41" name="ZoneTexte 40"/>
+          <p:cNvSpPr txBox="1"/>
+          <p:nvPr/>
+        </p:nvSpPr>
+        <p:spPr>
+          <a:xfrm>
+            <a:off x="6012160" y="3635732"/>
+            <a:ext cx="1656184" cy="369332"/>
+          </a:xfrm>
+          <a:prstGeom prst="rect">
+            <a:avLst/>
+          </a:prstGeom>
+          <a:noFill/>
+        </p:spPr>
+        <p:txBody>
+          <a:bodyPr wrap="square" rtlCol="0">
+            <a:spAutoFit/>
+          </a:bodyPr>
+          <a:lstStyle/>
+          <a:p>
+            <a:r>
+              <a:rPr lang="en-US" dirty="0" smtClean="0"/>
+              <a:t>openETCS API</a:t>
+            </a:r>
+            <a:endParaRPr lang="en-US" dirty="0"/>
+          </a:p>
+        </p:txBody>
+      </p:sp>
+      <p:sp>
+        <p:nvSpPr>
+          <p:cNvPr id="43" name="ZoneTexte 42"/>
+          <p:cNvSpPr txBox="1"/>
+          <p:nvPr/>
+        </p:nvSpPr>
+        <p:spPr>
+          <a:xfrm>
+            <a:off x="6588224" y="5085184"/>
+            <a:ext cx="1656184" cy="646331"/>
+          </a:xfrm>
+          <a:prstGeom prst="rect">
+            <a:avLst/>
+          </a:prstGeom>
+          <a:noFill/>
+        </p:spPr>
+        <p:txBody>
+          <a:bodyPr wrap="square" rtlCol="0">
+            <a:spAutoFit/>
+          </a:bodyPr>
+          <a:lstStyle/>
+          <a:p>
+            <a:r>
+              <a:rPr lang="en-US" dirty="0" smtClean="0"/>
+              <a:t>Vendor specific</a:t>
+            </a:r>
+            <a:br>
+              <a:rPr lang="en-US" dirty="0" smtClean="0"/>
+            </a:br>
+            <a:r>
+              <a:rPr lang="en-US" dirty="0" smtClean="0"/>
+              <a:t>API</a:t>
+            </a:r>
+            <a:endParaRPr lang="en-US" dirty="0"/>
+          </a:p>
+        </p:txBody>
+      </p:sp>
+      <p:sp>
+        <p:nvSpPr>
+          <p:cNvPr id="32" name="Rectangle 31"/>
+          <p:cNvSpPr/>
+          <p:nvPr/>
+        </p:nvSpPr>
+        <p:spPr>
+          <a:xfrm>
+            <a:off x="7092280" y="2780928"/>
+            <a:ext cx="720080" cy="504056"/>
+          </a:xfrm>
+          <a:prstGeom prst="rect">
+            <a:avLst/>
+          </a:prstGeom>
+          <a:ln>
+            <a:prstDash val="dash"/>
+          </a:ln>
+        </p:spPr>
+        <p:style>
+          <a:lnRef idx="2">
+            <a:schemeClr val="dk1"/>
+          </a:lnRef>
+          <a:fillRef idx="1">
+            <a:schemeClr val="lt1"/>
+          </a:fillRef>
+          <a:effectRef idx="0">
+            <a:schemeClr val="dk1"/>
+          </a:effectRef>
+          <a:fontRef idx="minor">
+            <a:schemeClr val="dk1"/>
+          </a:fontRef>
+        </p:style>
+        <p:txBody>
+          <a:bodyPr rtlCol="0" anchor="ctr"/>
+          <a:lstStyle/>
+          <a:p>
+            <a:pPr algn="ctr"/>
+            <a:r>
+              <a:rPr lang="en-US" dirty="0" smtClean="0"/>
+              <a:t>ODO</a:t>
+            </a:r>
+            <a:endParaRPr lang="en-US" dirty="0"/>
+          </a:p>
+        </p:txBody>
+      </p:sp>
       <p:cxnSp>
         <p:nvCxnSpPr>
-          <p:cNvPr id="35" name="Connecteur droit avec flèche 34"/>
-          <p:cNvCxnSpPr/>
+          <p:cNvPr id="33" name="Connecteur droit avec flèche 32"/>
+          <p:cNvCxnSpPr>
+            <a:stCxn id="32" idx="2"/>
+            <a:endCxn id="59" idx="1"/>
+          </p:cNvCxnSpPr>
           <p:nvPr/>
         </p:nvCxnSpPr>
         <p:spPr>
-          <a:xfrm>
-            <a:off x="5436096" y="4725144"/>
-            <a:ext cx="0" cy="792088"/>
+          <a:xfrm rot="5400000">
+            <a:off x="6179036" y="3379852"/>
+            <a:ext cx="1368152" cy="1178417"/>
+          </a:xfrm>
+          <a:prstGeom prst="bentConnector2">
+            <a:avLst/>
+          </a:prstGeom>
+          <a:ln>
+            <a:solidFill>
+              <a:schemeClr val="tx1"/>
+            </a:solidFill>
+            <a:prstDash val="sysDash"/>
+            <a:headEnd type="arrow" w="med" len="med"/>
+            <a:tailEnd type="arrow" w="med" len="med"/>
+          </a:ln>
+        </p:spPr>
+        <p:style>
+          <a:lnRef idx="2">
+            <a:schemeClr val="accent1"/>
+          </a:lnRef>
+          <a:fillRef idx="0">
+            <a:schemeClr val="accent1"/>
+          </a:fillRef>
+          <a:effectRef idx="1">
+            <a:schemeClr val="accent1"/>
+          </a:effectRef>
+          <a:fontRef idx="minor">
+            <a:schemeClr val="tx1"/>
+          </a:fontRef>
+        </p:style>
+      </p:cxnSp>
+      <p:sp>
+        <p:nvSpPr>
+          <p:cNvPr id="50" name="Accolade ouvrante 49"/>
+          <p:cNvSpPr/>
+          <p:nvPr/>
+        </p:nvSpPr>
+        <p:spPr>
+          <a:xfrm>
+            <a:off x="1547664" y="1268760"/>
+            <a:ext cx="189735" cy="2448272"/>
+          </a:xfrm>
+          <a:prstGeom prst="leftBrace">
+            <a:avLst/>
+          </a:prstGeom>
+        </p:spPr>
+        <p:style>
+          <a:lnRef idx="2">
+            <a:schemeClr val="accent1"/>
+          </a:lnRef>
+          <a:fillRef idx="0">
+            <a:schemeClr val="accent1"/>
+          </a:fillRef>
+          <a:effectRef idx="1">
+            <a:schemeClr val="accent1"/>
+          </a:effectRef>
+          <a:fontRef idx="minor">
+            <a:schemeClr val="tx1"/>
+          </a:fontRef>
+        </p:style>
+        <p:txBody>
+          <a:bodyPr rtlCol="0" anchor="ctr"/>
+          <a:lstStyle/>
+          <a:p>
+            <a:pPr algn="ctr"/>
+            <a:endParaRPr lang="en-US"/>
+          </a:p>
+        </p:txBody>
+      </p:sp>
+      <p:sp>
+        <p:nvSpPr>
+          <p:cNvPr id="51" name="ZoneTexte 50"/>
+          <p:cNvSpPr txBox="1"/>
+          <p:nvPr/>
+        </p:nvSpPr>
+        <p:spPr>
+          <a:xfrm>
+            <a:off x="323528" y="2132856"/>
+            <a:ext cx="1296144" cy="646331"/>
+          </a:xfrm>
+          <a:prstGeom prst="rect">
+            <a:avLst/>
+          </a:prstGeom>
+          <a:noFill/>
+        </p:spPr>
+        <p:txBody>
+          <a:bodyPr wrap="square" rtlCol="0">
+            <a:spAutoFit/>
+          </a:bodyPr>
+          <a:lstStyle/>
+          <a:p>
+            <a:pPr algn="r"/>
+            <a:r>
+              <a:rPr lang="en-US" dirty="0" smtClean="0"/>
+              <a:t>Application software</a:t>
+            </a:r>
+            <a:endParaRPr lang="en-US" dirty="0"/>
+          </a:p>
+        </p:txBody>
+      </p:sp>
+      <p:sp>
+        <p:nvSpPr>
+          <p:cNvPr id="52" name="Accolade ouvrante 51"/>
+          <p:cNvSpPr/>
+          <p:nvPr/>
+        </p:nvSpPr>
+        <p:spPr>
+          <a:xfrm>
+            <a:off x="1547664" y="3789040"/>
+            <a:ext cx="189735" cy="1440160"/>
+          </a:xfrm>
+          <a:prstGeom prst="leftBrace">
+            <a:avLst/>
+          </a:prstGeom>
+        </p:spPr>
+        <p:style>
+          <a:lnRef idx="2">
+            <a:schemeClr val="accent1"/>
+          </a:lnRef>
+          <a:fillRef idx="0">
+            <a:schemeClr val="accent1"/>
+          </a:fillRef>
+          <a:effectRef idx="1">
+            <a:schemeClr val="accent1"/>
+          </a:effectRef>
+          <a:fontRef idx="minor">
+            <a:schemeClr val="tx1"/>
+          </a:fontRef>
+        </p:style>
+        <p:txBody>
+          <a:bodyPr rtlCol="0" anchor="ctr"/>
+          <a:lstStyle/>
+          <a:p>
+            <a:pPr algn="ctr"/>
+            <a:endParaRPr lang="en-US"/>
+          </a:p>
+        </p:txBody>
+      </p:sp>
+      <p:sp>
+        <p:nvSpPr>
+          <p:cNvPr id="53" name="ZoneTexte 52"/>
+          <p:cNvSpPr txBox="1"/>
+          <p:nvPr/>
+        </p:nvSpPr>
+        <p:spPr>
+          <a:xfrm>
+            <a:off x="251520" y="4077072"/>
+            <a:ext cx="1296144" cy="646331"/>
+          </a:xfrm>
+          <a:prstGeom prst="rect">
+            <a:avLst/>
+          </a:prstGeom>
+          <a:noFill/>
+        </p:spPr>
+        <p:txBody>
+          <a:bodyPr wrap="square" rtlCol="0">
+            <a:spAutoFit/>
+          </a:bodyPr>
+          <a:lstStyle/>
+          <a:p>
+            <a:pPr algn="r"/>
+            <a:r>
+              <a:rPr lang="en-US" dirty="0" smtClean="0"/>
+              <a:t>Basic software</a:t>
+            </a:r>
+            <a:endParaRPr lang="en-US" dirty="0"/>
+          </a:p>
+        </p:txBody>
+      </p:sp>
+      <p:sp>
+        <p:nvSpPr>
+          <p:cNvPr id="37" name="Rectangle 36"/>
+          <p:cNvSpPr/>
+          <p:nvPr/>
+        </p:nvSpPr>
+        <p:spPr>
+          <a:xfrm>
+            <a:off x="8028384" y="2780928"/>
+            <a:ext cx="720080" cy="504056"/>
+          </a:xfrm>
+          <a:prstGeom prst="rect">
+            <a:avLst/>
+          </a:prstGeom>
+          <a:ln>
+            <a:prstDash val="dash"/>
+          </a:ln>
+        </p:spPr>
+        <p:style>
+          <a:lnRef idx="2">
+            <a:schemeClr val="dk1"/>
+          </a:lnRef>
+          <a:fillRef idx="1">
+            <a:schemeClr val="lt1"/>
+          </a:fillRef>
+          <a:effectRef idx="0">
+            <a:schemeClr val="dk1"/>
+          </a:effectRef>
+          <a:fontRef idx="minor">
+            <a:schemeClr val="dk1"/>
+          </a:fontRef>
+        </p:style>
+        <p:txBody>
+          <a:bodyPr rtlCol="0" anchor="ctr"/>
+          <a:lstStyle/>
+          <a:p>
+            <a:pPr algn="ctr"/>
+            <a:r>
+              <a:rPr lang="en-US" dirty="0" smtClean="0"/>
+              <a:t>…</a:t>
+            </a:r>
+            <a:endParaRPr lang="en-US" dirty="0"/>
+          </a:p>
+        </p:txBody>
+      </p:sp>
+      <p:cxnSp>
+        <p:nvCxnSpPr>
+          <p:cNvPr id="44" name="Connecteur droit avec flèche 32"/>
+          <p:cNvCxnSpPr>
+            <a:stCxn id="37" idx="2"/>
+            <a:endCxn id="59" idx="1"/>
+          </p:cNvCxnSpPr>
+          <p:nvPr/>
+        </p:nvCxnSpPr>
+        <p:spPr>
+          <a:xfrm rot="5400000">
+            <a:off x="6647088" y="2911800"/>
+            <a:ext cx="1368152" cy="2114521"/>
+          </a:xfrm>
+          <a:prstGeom prst="bentConnector2">
+            <a:avLst/>
+          </a:prstGeom>
+          <a:ln>
+            <a:solidFill>
+              <a:schemeClr val="tx1"/>
+            </a:solidFill>
+            <a:prstDash val="sysDash"/>
+            <a:headEnd type="arrow" w="med" len="med"/>
+            <a:tailEnd type="arrow" w="med" len="med"/>
+          </a:ln>
+        </p:spPr>
+        <p:style>
+          <a:lnRef idx="2">
+            <a:schemeClr val="accent1"/>
+          </a:lnRef>
+          <a:fillRef idx="0">
+            <a:schemeClr val="accent1"/>
+          </a:fillRef>
+          <a:effectRef idx="1">
+            <a:schemeClr val="accent1"/>
+          </a:effectRef>
+          <a:fontRef idx="minor">
+            <a:schemeClr val="tx1"/>
+          </a:fontRef>
+        </p:style>
+      </p:cxnSp>
+      <p:sp>
+        <p:nvSpPr>
+          <p:cNvPr id="6" name="Rectangle 5"/>
+          <p:cNvSpPr/>
+          <p:nvPr/>
+        </p:nvSpPr>
+        <p:spPr>
+          <a:xfrm>
+            <a:off x="1979712" y="4077072"/>
+            <a:ext cx="1080120" cy="792088"/>
+          </a:xfrm>
+          <a:prstGeom prst="rect">
+            <a:avLst/>
+          </a:prstGeom>
+        </p:spPr>
+        <p:style>
+          <a:lnRef idx="1">
+            <a:schemeClr val="accent3"/>
+          </a:lnRef>
+          <a:fillRef idx="3">
+            <a:schemeClr val="accent3"/>
+          </a:fillRef>
+          <a:effectRef idx="2">
+            <a:schemeClr val="accent3"/>
+          </a:effectRef>
+          <a:fontRef idx="minor">
+            <a:schemeClr val="lt1"/>
+          </a:fontRef>
+        </p:style>
+        <p:txBody>
+          <a:bodyPr rtlCol="0" anchor="ctr"/>
+          <a:lstStyle/>
+          <a:p>
+            <a:pPr algn="ctr"/>
+            <a:r>
+              <a:rPr lang="en-US" dirty="0" smtClean="0"/>
+              <a:t>Alstom API adapter</a:t>
+            </a:r>
+            <a:endParaRPr lang="en-US" dirty="0"/>
+          </a:p>
+        </p:txBody>
+      </p:sp>
+      <p:sp>
+        <p:nvSpPr>
+          <p:cNvPr id="19" name="Rectangle 18"/>
+          <p:cNvSpPr/>
+          <p:nvPr/>
+        </p:nvSpPr>
+        <p:spPr>
+          <a:xfrm>
+            <a:off x="1979712" y="5517232"/>
+            <a:ext cx="1080120" cy="792088"/>
+          </a:xfrm>
+          <a:prstGeom prst="rect">
+            <a:avLst/>
+          </a:prstGeom>
+        </p:spPr>
+        <p:style>
+          <a:lnRef idx="1">
+            <a:schemeClr val="accent3"/>
+          </a:lnRef>
+          <a:fillRef idx="3">
+            <a:schemeClr val="accent3"/>
+          </a:fillRef>
+          <a:effectRef idx="2">
+            <a:schemeClr val="accent3"/>
+          </a:effectRef>
+          <a:fontRef idx="minor">
+            <a:schemeClr val="lt1"/>
+          </a:fontRef>
+        </p:style>
+        <p:txBody>
+          <a:bodyPr rtlCol="0" anchor="ctr"/>
+          <a:lstStyle/>
+          <a:p>
+            <a:pPr algn="ctr"/>
+            <a:r>
+              <a:rPr lang="en-US" dirty="0" smtClean="0"/>
+              <a:t>Alstom specific platform</a:t>
+            </a:r>
+            <a:endParaRPr lang="en-US" dirty="0"/>
+          </a:p>
+        </p:txBody>
+      </p:sp>
+      <p:cxnSp>
+        <p:nvCxnSpPr>
+          <p:cNvPr id="31" name="Connecteur droit avec flèche 30"/>
+          <p:cNvCxnSpPr>
+            <a:stCxn id="6" idx="2"/>
+            <a:endCxn id="19" idx="0"/>
+          </p:cNvCxnSpPr>
+          <p:nvPr/>
+        </p:nvCxnSpPr>
+        <p:spPr>
+          <a:xfrm>
+            <a:off x="2519772" y="4869160"/>
+            <a:ext cx="0" cy="648072"/>
           </a:xfrm>
           <a:prstGeom prst="straightConnector1">
             <a:avLst/>
@@ -3953,208 +4303,20 @@
           </a:fontRef>
         </p:style>
       </p:cxnSp>
-      <p:cxnSp>
-        <p:nvCxnSpPr>
-          <p:cNvPr id="36" name="Connecteur droit avec flèche 35"/>
-          <p:cNvCxnSpPr/>
+      <p:sp>
+        <p:nvSpPr>
+          <p:cNvPr id="56" name="Accolade ouvrante 55"/>
+          <p:cNvSpPr/>
           <p:nvPr/>
-        </p:nvCxnSpPr>
-        <p:spPr>
-          <a:xfrm>
-            <a:off x="6588224" y="4725144"/>
-            <a:ext cx="0" cy="792088"/>
-          </a:xfrm>
-          <a:prstGeom prst="straightConnector1">
+        </p:nvSpPr>
+        <p:spPr>
+          <a:xfrm rot="5400000">
+            <a:off x="3887924" y="1880828"/>
+            <a:ext cx="216024" cy="4176464"/>
+          </a:xfrm>
+          <a:prstGeom prst="leftBrace">
             <a:avLst/>
           </a:prstGeom>
-          <a:ln>
-            <a:headEnd type="arrow" w="med" len="med"/>
-            <a:tailEnd type="arrow" w="med" len="med"/>
-          </a:ln>
-        </p:spPr>
-        <p:style>
-          <a:lnRef idx="2">
-            <a:schemeClr val="accent3"/>
-          </a:lnRef>
-          <a:fillRef idx="0">
-            <a:schemeClr val="accent3"/>
-          </a:fillRef>
-          <a:effectRef idx="1">
-            <a:schemeClr val="accent3"/>
-          </a:effectRef>
-          <a:fontRef idx="minor">
-            <a:schemeClr val="tx1"/>
-          </a:fontRef>
-        </p:style>
-      </p:cxnSp>
-      <p:sp>
-        <p:nvSpPr>
-          <p:cNvPr id="39" name="ZoneTexte 38"/>
-          <p:cNvSpPr txBox="1"/>
-          <p:nvPr/>
-        </p:nvSpPr>
-        <p:spPr>
-          <a:xfrm>
-            <a:off x="7020272" y="2204864"/>
-            <a:ext cx="1656184" cy="369332"/>
-          </a:xfrm>
-          <a:prstGeom prst="rect">
-            <a:avLst/>
-          </a:prstGeom>
-          <a:noFill/>
-        </p:spPr>
-        <p:txBody>
-          <a:bodyPr wrap="square" rtlCol="0">
-            <a:spAutoFit/>
-          </a:bodyPr>
-          <a:lstStyle/>
-          <a:p>
-            <a:r>
-              <a:rPr lang="en-US" dirty="0" smtClean="0"/>
-              <a:t>model interface</a:t>
-            </a:r>
-            <a:endParaRPr lang="en-US" dirty="0"/>
-          </a:p>
-        </p:txBody>
-      </p:sp>
-      <p:sp>
-        <p:nvSpPr>
-          <p:cNvPr id="41" name="ZoneTexte 40"/>
-          <p:cNvSpPr txBox="1"/>
-          <p:nvPr/>
-        </p:nvSpPr>
-        <p:spPr>
-          <a:xfrm>
-            <a:off x="6948264" y="3491716"/>
-            <a:ext cx="1656184" cy="369332"/>
-          </a:xfrm>
-          <a:prstGeom prst="rect">
-            <a:avLst/>
-          </a:prstGeom>
-          <a:noFill/>
-        </p:spPr>
-        <p:txBody>
-          <a:bodyPr wrap="square" rtlCol="0">
-            <a:spAutoFit/>
-          </a:bodyPr>
-          <a:lstStyle/>
-          <a:p>
-            <a:r>
-              <a:rPr lang="en-US" dirty="0" smtClean="0"/>
-              <a:t>openETCS API</a:t>
-            </a:r>
-            <a:endParaRPr lang="en-US" dirty="0"/>
-          </a:p>
-        </p:txBody>
-      </p:sp>
-      <p:sp>
-        <p:nvSpPr>
-          <p:cNvPr id="43" name="ZoneTexte 42"/>
-          <p:cNvSpPr txBox="1"/>
-          <p:nvPr/>
-        </p:nvSpPr>
-        <p:spPr>
-          <a:xfrm>
-            <a:off x="7236296" y="5085184"/>
-            <a:ext cx="1656184" cy="646331"/>
-          </a:xfrm>
-          <a:prstGeom prst="rect">
-            <a:avLst/>
-          </a:prstGeom>
-          <a:noFill/>
-        </p:spPr>
-        <p:txBody>
-          <a:bodyPr wrap="square" rtlCol="0">
-            <a:spAutoFit/>
-          </a:bodyPr>
-          <a:lstStyle/>
-          <a:p>
-            <a:r>
-              <a:rPr lang="en-US" dirty="0" smtClean="0"/>
-              <a:t>Vendor specific</a:t>
-            </a:r>
-            <a:br>
-              <a:rPr lang="en-US" dirty="0" smtClean="0"/>
-            </a:br>
-            <a:r>
-              <a:rPr lang="en-US" dirty="0" smtClean="0"/>
-              <a:t>API</a:t>
-            </a:r>
-            <a:endParaRPr lang="en-US" dirty="0"/>
-          </a:p>
-        </p:txBody>
-      </p:sp>
-      <p:sp>
-        <p:nvSpPr>
-          <p:cNvPr id="32" name="Rectangle 31"/>
-          <p:cNvSpPr/>
-          <p:nvPr/>
-        </p:nvSpPr>
-        <p:spPr>
-          <a:xfrm>
-            <a:off x="7452320" y="2780928"/>
-            <a:ext cx="1152128" cy="504056"/>
-          </a:xfrm>
-          <a:prstGeom prst="rect">
-            <a:avLst/>
-          </a:prstGeom>
-          <a:ln>
-            <a:prstDash val="dash"/>
-          </a:ln>
-        </p:spPr>
-        <p:style>
-          <a:lnRef idx="2">
-            <a:schemeClr val="dk1"/>
-          </a:lnRef>
-          <a:fillRef idx="1">
-            <a:schemeClr val="lt1"/>
-          </a:fillRef>
-          <a:effectRef idx="0">
-            <a:schemeClr val="dk1"/>
-          </a:effectRef>
-          <a:fontRef idx="minor">
-            <a:schemeClr val="dk1"/>
-          </a:fontRef>
-        </p:style>
-        <p:txBody>
-          <a:bodyPr rtlCol="0" anchor="ctr"/>
-          <a:lstStyle/>
-          <a:p>
-            <a:pPr algn="ctr"/>
-            <a:r>
-              <a:rPr lang="en-US" dirty="0" err="1" smtClean="0"/>
-              <a:t>Odometry</a:t>
-            </a:r>
-            <a:endParaRPr lang="en-US" dirty="0"/>
-          </a:p>
-        </p:txBody>
-      </p:sp>
-      <p:cxnSp>
-        <p:nvCxnSpPr>
-          <p:cNvPr id="33" name="Connecteur droit avec flèche 32"/>
-          <p:cNvCxnSpPr>
-            <a:endCxn id="10" idx="3"/>
-          </p:cNvCxnSpPr>
-          <p:nvPr/>
-        </p:nvCxnSpPr>
-        <p:spPr>
-          <a:xfrm rot="10800000" flipV="1">
-            <a:off x="7164288" y="3284984"/>
-            <a:ext cx="1224136" cy="1044116"/>
-          </a:xfrm>
-          <a:prstGeom prst="bentConnector3">
-            <a:avLst>
-              <a:gd name="adj1" fmla="val -4"/>
-            </a:avLst>
-          </a:prstGeom>
-          <a:ln>
-            <a:solidFill>
-              <a:schemeClr val="tx1"/>
-            </a:solidFill>
-            <a:prstDash val="sysDash"/>
-            <a:headEnd type="arrow" w="med" len="med"/>
-            <a:tailEnd type="arrow" w="med" len="med"/>
-          </a:ln>
         </p:spPr>
         <p:style>
           <a:lnRef idx="2">
@@ -4170,17 +4332,25 @@
             <a:schemeClr val="tx1"/>
           </a:fontRef>
         </p:style>
-      </p:cxnSp>
-      <p:sp>
-        <p:nvSpPr>
-          <p:cNvPr id="50" name="Accolade ouvrante 49"/>
+        <p:txBody>
+          <a:bodyPr rtlCol="0" anchor="ctr"/>
+          <a:lstStyle/>
+          <a:p>
+            <a:pPr algn="ctr"/>
+            <a:endParaRPr lang="en-US"/>
+          </a:p>
+        </p:txBody>
+      </p:sp>
+      <p:sp>
+        <p:nvSpPr>
+          <p:cNvPr id="59" name="Accolade ouvrante 58"/>
           <p:cNvSpPr/>
           <p:nvPr/>
         </p:nvSpPr>
         <p:spPr>
-          <a:xfrm>
-            <a:off x="2195736" y="1268760"/>
-            <a:ext cx="189735" cy="2448272"/>
+          <a:xfrm flipH="1">
+            <a:off x="6084168" y="4149080"/>
+            <a:ext cx="189735" cy="1008112"/>
           </a:xfrm>
           <a:prstGeom prst="leftBrace">
             <a:avLst/>
@@ -4206,106 +4376,6 @@
           <a:p>
             <a:pPr algn="ctr"/>
             <a:endParaRPr lang="en-US"/>
-          </a:p>
-        </p:txBody>
-      </p:sp>
-      <p:sp>
-        <p:nvSpPr>
-          <p:cNvPr id="51" name="ZoneTexte 50"/>
-          <p:cNvSpPr txBox="1"/>
-          <p:nvPr/>
-        </p:nvSpPr>
-        <p:spPr>
-          <a:xfrm>
-            <a:off x="971600" y="2132856"/>
-            <a:ext cx="1296144" cy="646331"/>
-          </a:xfrm>
-          <a:prstGeom prst="rect">
-            <a:avLst/>
-          </a:prstGeom>
-          <a:noFill/>
-        </p:spPr>
-        <p:txBody>
-          <a:bodyPr wrap="square" rtlCol="0">
-            <a:spAutoFit/>
-          </a:bodyPr>
-          <a:lstStyle/>
-          <a:p>
-            <a:pPr algn="r"/>
-            <a:r>
-              <a:rPr lang="en-US" dirty="0" smtClean="0"/>
-              <a:t>Application software</a:t>
-            </a:r>
-            <a:endParaRPr lang="en-US" dirty="0"/>
-          </a:p>
-        </p:txBody>
-      </p:sp>
-      <p:sp>
-        <p:nvSpPr>
-          <p:cNvPr id="52" name="Accolade ouvrante 51"/>
-          <p:cNvSpPr/>
-          <p:nvPr/>
-        </p:nvSpPr>
-        <p:spPr>
-          <a:xfrm>
-            <a:off x="2195736" y="3789040"/>
-            <a:ext cx="189735" cy="1440160"/>
-          </a:xfrm>
-          <a:prstGeom prst="leftBrace">
-            <a:avLst/>
-          </a:prstGeom>
-        </p:spPr>
-        <p:style>
-          <a:lnRef idx="2">
-            <a:schemeClr val="accent1"/>
-          </a:lnRef>
-          <a:fillRef idx="0">
-            <a:schemeClr val="accent1"/>
-          </a:fillRef>
-          <a:effectRef idx="1">
-            <a:schemeClr val="accent1"/>
-          </a:effectRef>
-          <a:fontRef idx="minor">
-            <a:schemeClr val="tx1"/>
-          </a:fontRef>
-        </p:style>
-        <p:txBody>
-          <a:bodyPr rtlCol="0" anchor="ctr"/>
-          <a:lstStyle/>
-          <a:p>
-            <a:pPr algn="ctr"/>
-            <a:endParaRPr lang="en-US"/>
-          </a:p>
-        </p:txBody>
-      </p:sp>
-      <p:sp>
-        <p:nvSpPr>
-          <p:cNvPr id="53" name="ZoneTexte 52"/>
-          <p:cNvSpPr txBox="1"/>
-          <p:nvPr/>
-        </p:nvSpPr>
-        <p:spPr>
-          <a:xfrm>
-            <a:off x="899592" y="4077072"/>
-            <a:ext cx="1296144" cy="646331"/>
-          </a:xfrm>
-          <a:prstGeom prst="rect">
-            <a:avLst/>
-          </a:prstGeom>
-          <a:noFill/>
-        </p:spPr>
-        <p:txBody>
-          <a:bodyPr wrap="square" rtlCol="0">
-            <a:spAutoFit/>
-          </a:bodyPr>
-          <a:lstStyle/>
-          <a:p>
-            <a:pPr algn="r"/>
-            <a:r>
-              <a:rPr lang="en-US" dirty="0" smtClean="0"/>
-              <a:t>Basic software</a:t>
-            </a:r>
-            <a:endParaRPr lang="en-US" dirty="0"/>
           </a:p>
         </p:txBody>
       </p:sp>

</xml_diff>